<commit_message>
Added task to PowerPoint
</commit_message>
<xml_diff>
--- a/doc/Event Sourcing.pptx
+++ b/doc/Event Sourcing.pptx
@@ -15,6 +15,7 @@
     <p:sldId id="260" r:id="rId9"/>
     <p:sldId id="261" r:id="rId10"/>
     <p:sldId id="262" r:id="rId11"/>
+    <p:sldId id="266" r:id="rId12"/>
   </p:sldIdLst>
   <p:sldSz cx="12192000" cy="6858000"/>
   <p:notesSz cx="6858000" cy="9144000"/>
@@ -113,6 +114,11 @@
       </a:defRPr>
     </a:lvl9pPr>
   </p:defaultTextStyle>
+  <p:extLst>
+    <p:ext uri="{EFAFB233-063F-42B5-8137-9DF3F51BA10A}">
+      <p15:sldGuideLst xmlns:p15="http://schemas.microsoft.com/office/powerpoint/2012/main"/>
+    </p:ext>
+  </p:extLst>
 </p:presentation>
 </file>
 
@@ -247,7 +253,7 @@
           <a:p>
             <a:fld id="{50143A94-293D-4C13-8869-84F36E174A6B}" type="datetimeFigureOut">
               <a:rPr lang="en-US" smtClean="0"/>
-              <a:t>3/25/2016</a:t>
+              <a:t>3/26/2016</a:t>
             </a:fld>
             <a:endParaRPr lang="en-US"/>
           </a:p>
@@ -417,7 +423,7 @@
           <a:p>
             <a:fld id="{50143A94-293D-4C13-8869-84F36E174A6B}" type="datetimeFigureOut">
               <a:rPr lang="en-US" smtClean="0"/>
-              <a:t>3/25/2016</a:t>
+              <a:t>3/26/2016</a:t>
             </a:fld>
             <a:endParaRPr lang="en-US"/>
           </a:p>
@@ -597,7 +603,7 @@
           <a:p>
             <a:fld id="{50143A94-293D-4C13-8869-84F36E174A6B}" type="datetimeFigureOut">
               <a:rPr lang="en-US" smtClean="0"/>
-              <a:t>3/25/2016</a:t>
+              <a:t>3/26/2016</a:t>
             </a:fld>
             <a:endParaRPr lang="en-US"/>
           </a:p>
@@ -767,7 +773,7 @@
           <a:p>
             <a:fld id="{50143A94-293D-4C13-8869-84F36E174A6B}" type="datetimeFigureOut">
               <a:rPr lang="en-US" smtClean="0"/>
-              <a:t>3/25/2016</a:t>
+              <a:t>3/26/2016</a:t>
             </a:fld>
             <a:endParaRPr lang="en-US"/>
           </a:p>
@@ -1013,7 +1019,7 @@
           <a:p>
             <a:fld id="{50143A94-293D-4C13-8869-84F36E174A6B}" type="datetimeFigureOut">
               <a:rPr lang="en-US" smtClean="0"/>
-              <a:t>3/25/2016</a:t>
+              <a:t>3/26/2016</a:t>
             </a:fld>
             <a:endParaRPr lang="en-US"/>
           </a:p>
@@ -1245,7 +1251,7 @@
           <a:p>
             <a:fld id="{50143A94-293D-4C13-8869-84F36E174A6B}" type="datetimeFigureOut">
               <a:rPr lang="en-US" smtClean="0"/>
-              <a:t>3/25/2016</a:t>
+              <a:t>3/26/2016</a:t>
             </a:fld>
             <a:endParaRPr lang="en-US"/>
           </a:p>
@@ -1612,7 +1618,7 @@
           <a:p>
             <a:fld id="{50143A94-293D-4C13-8869-84F36E174A6B}" type="datetimeFigureOut">
               <a:rPr lang="en-US" smtClean="0"/>
-              <a:t>3/25/2016</a:t>
+              <a:t>3/26/2016</a:t>
             </a:fld>
             <a:endParaRPr lang="en-US"/>
           </a:p>
@@ -1730,7 +1736,7 @@
           <a:p>
             <a:fld id="{50143A94-293D-4C13-8869-84F36E174A6B}" type="datetimeFigureOut">
               <a:rPr lang="en-US" smtClean="0"/>
-              <a:t>3/25/2016</a:t>
+              <a:t>3/26/2016</a:t>
             </a:fld>
             <a:endParaRPr lang="en-US"/>
           </a:p>
@@ -1825,7 +1831,7 @@
           <a:p>
             <a:fld id="{50143A94-293D-4C13-8869-84F36E174A6B}" type="datetimeFigureOut">
               <a:rPr lang="en-US" smtClean="0"/>
-              <a:t>3/25/2016</a:t>
+              <a:t>3/26/2016</a:t>
             </a:fld>
             <a:endParaRPr lang="en-US"/>
           </a:p>
@@ -2102,7 +2108,7 @@
           <a:p>
             <a:fld id="{50143A94-293D-4C13-8869-84F36E174A6B}" type="datetimeFigureOut">
               <a:rPr lang="en-US" smtClean="0"/>
-              <a:t>3/25/2016</a:t>
+              <a:t>3/26/2016</a:t>
             </a:fld>
             <a:endParaRPr lang="en-US"/>
           </a:p>
@@ -2355,7 +2361,7 @@
           <a:p>
             <a:fld id="{50143A94-293D-4C13-8869-84F36E174A6B}" type="datetimeFigureOut">
               <a:rPr lang="en-US" smtClean="0"/>
-              <a:t>3/25/2016</a:t>
+              <a:t>3/26/2016</a:t>
             </a:fld>
             <a:endParaRPr lang="en-US"/>
           </a:p>
@@ -2568,7 +2574,7 @@
           <a:p>
             <a:fld id="{50143A94-293D-4C13-8869-84F36E174A6B}" type="datetimeFigureOut">
               <a:rPr lang="en-US" smtClean="0"/>
-              <a:t>3/25/2016</a:t>
+              <a:t>3/26/2016</a:t>
             </a:fld>
             <a:endParaRPr lang="en-US"/>
           </a:p>
@@ -3264,6 +3270,125 @@
     <p:extLst>
       <p:ext uri="{BB962C8B-B14F-4D97-AF65-F5344CB8AC3E}">
         <p14:creationId xmlns:p14="http://schemas.microsoft.com/office/powerpoint/2010/main" val="2875176333"/>
+      </p:ext>
+    </p:extLst>
+  </p:cSld>
+  <p:clrMapOvr>
+    <a:masterClrMapping/>
+  </p:clrMapOvr>
+</p:sld>
+</file>
+
+<file path=ppt/slides/slide11.xml><?xml version="1.0" encoding="utf-8"?>
+<p:sld xmlns:a="http://schemas.openxmlformats.org/drawingml/2006/main" xmlns:r="http://schemas.openxmlformats.org/officeDocument/2006/relationships" xmlns:p="http://schemas.openxmlformats.org/presentationml/2006/main">
+  <p:cSld>
+    <p:spTree>
+      <p:nvGrpSpPr>
+        <p:cNvPr id="1" name=""/>
+        <p:cNvGrpSpPr/>
+        <p:nvPr/>
+      </p:nvGrpSpPr>
+      <p:grpSpPr>
+        <a:xfrm>
+          <a:off x="0" y="0"/>
+          <a:ext cx="0" cy="0"/>
+          <a:chOff x="0" y="0"/>
+          <a:chExt cx="0" cy="0"/>
+        </a:xfrm>
+      </p:grpSpPr>
+      <p:sp>
+        <p:nvSpPr>
+          <p:cNvPr id="2" name="Title 1"/>
+          <p:cNvSpPr>
+            <a:spLocks noGrp="1"/>
+          </p:cNvSpPr>
+          <p:nvPr>
+            <p:ph type="title"/>
+          </p:nvPr>
+        </p:nvSpPr>
+        <p:spPr/>
+        <p:txBody>
+          <a:bodyPr/>
+          <a:lstStyle/>
+          <a:p>
+            <a:r>
+              <a:rPr lang="en-US" dirty="0" smtClean="0"/>
+              <a:t>Task</a:t>
+            </a:r>
+            <a:endParaRPr lang="en-US" dirty="0"/>
+          </a:p>
+        </p:txBody>
+      </p:sp>
+      <p:sp>
+        <p:nvSpPr>
+          <p:cNvPr id="3" name="Content Placeholder 2"/>
+          <p:cNvSpPr>
+            <a:spLocks noGrp="1"/>
+          </p:cNvSpPr>
+          <p:nvPr>
+            <p:ph idx="1"/>
+          </p:nvPr>
+        </p:nvSpPr>
+        <p:spPr/>
+        <p:txBody>
+          <a:bodyPr>
+            <a:normAutofit lnSpcReduction="10000"/>
+          </a:bodyPr>
+          <a:lstStyle/>
+          <a:p>
+            <a:pPr marL="0" indent="0">
+              <a:buNone/>
+            </a:pPr>
+            <a:r>
+              <a:rPr lang="en-US" dirty="0" smtClean="0"/>
+              <a:t>As part of the so called </a:t>
+            </a:r>
+            <a:r>
+              <a:rPr lang="en-US" b="1" i="1" dirty="0" smtClean="0"/>
+              <a:t>Heart Beat </a:t>
+            </a:r>
+            <a:r>
+              <a:rPr lang="en-US" dirty="0" smtClean="0"/>
+              <a:t>application which helps to measure the health of projects we want to be able to add new projects. To a project we want to assign a PM, CEM, a team lead and team members, and so on… </a:t>
+            </a:r>
+          </a:p>
+          <a:p>
+            <a:pPr marL="0" indent="0">
+              <a:buNone/>
+            </a:pPr>
+            <a:endParaRPr lang="en-US" dirty="0" smtClean="0"/>
+          </a:p>
+          <a:p>
+            <a:r>
+              <a:rPr lang="en-US" dirty="0" smtClean="0"/>
+              <a:t>Create a RESTful API with some endpoints to accept commands</a:t>
+            </a:r>
+          </a:p>
+          <a:p>
+            <a:r>
+              <a:rPr lang="en-US" dirty="0" smtClean="0"/>
+              <a:t>Convert the commands into appropriate events</a:t>
+            </a:r>
+          </a:p>
+          <a:p>
+            <a:r>
+              <a:rPr lang="en-US" dirty="0" smtClean="0"/>
+              <a:t>Store the events in an Event Store</a:t>
+            </a:r>
+          </a:p>
+          <a:p>
+            <a:r>
+              <a:rPr lang="en-US" dirty="0" smtClean="0"/>
+              <a:t>Create a tool that reads the events from the event store and generates a read model with them</a:t>
+            </a:r>
+            <a:endParaRPr lang="en-US" dirty="0"/>
+          </a:p>
+        </p:txBody>
+      </p:sp>
+    </p:spTree>
+    <p:extLst>
+      <p:ext uri="{BB962C8B-B14F-4D97-AF65-F5344CB8AC3E}">
+        <p14:creationId xmlns:p14="http://schemas.microsoft.com/office/powerpoint/2010/main" val="1682216338"/>
       </p:ext>
     </p:extLst>
   </p:cSld>

</xml_diff>